<commit_message>
formatting changes (parameters inline, added title, reduced font size)
</commit_message>
<xml_diff>
--- a/DemoPaper/Poster/DemoPoster.pptx
+++ b/DemoPaper/Poster/DemoPoster.pptx
@@ -6389,12 +6389,8 @@
           <a:lstStyle/>
           <a:p>
             <a:r>
-              <a:rPr lang="en-US" baseline="0" smtClean="0"/>
-              <a:t>Speech</a:t>
-            </a:r>
-            <a:r>
               <a:rPr lang="en-US" baseline="0" dirty="0" smtClean="0"/>
-              <a:t>/Story: </a:t>
+              <a:t>Speech/Story: </a:t>
             </a:r>
           </a:p>
           <a:p>
@@ -6402,9 +6398,6 @@
               <a:rPr lang="en-US" baseline="0" dirty="0" smtClean="0"/>
               <a:t>Have an actual story: suppose you are sales manager. you have a survey results on your customers, and want to learn more about your target demographic. you have this raw data which is hard to make sense of. Our system gives you this nice summary. And you can tune it and explore further. </a:t>
             </a:r>
-          </a:p>
-          <a:p>
-            <a:endParaRPr lang="en-US" baseline="0" dirty="0" smtClean="0"/>
           </a:p>
           <a:p>
             <a:r>
@@ -6471,15 +6464,6 @@
             <a:r>
               <a:rPr lang="en-US" baseline="0" dirty="0" smtClean="0"/>
               <a:t>Multiple sections: basics, more options, new dataset</a:t>
-            </a:r>
-          </a:p>
-          <a:p>
-            <a:endParaRPr lang="en-US" baseline="0" dirty="0" smtClean="0"/>
-          </a:p>
-          <a:p>
-            <a:r>
-              <a:rPr lang="en-US" baseline="0" dirty="0" smtClean="0"/>
-              <a:t>Interface: line on dataset in interface. put three parameters in same line. </a:t>
             </a:r>
           </a:p>
           <a:p>

</xml_diff>